<commit_message>
edit word and pptx
</commit_message>
<xml_diff>
--- a/Deliverables/Lorann - PowerPoint.pptx
+++ b/Deliverables/Lorann - PowerPoint.pptx
@@ -5431,7 +5431,7 @@
             </a:r>
             <a:r>
               <a:rPr lang="en-GB" dirty="0"/>
-              <a:t> can get killed if he encounters one of the following :</a:t>
+              <a:t> can get killed if he encounters one of the following:</a:t>
             </a:r>
             <a:endParaRPr lang="fr-FR" dirty="0"/>
           </a:p>
@@ -5642,7 +5642,15 @@
             </a:pPr>
             <a:r>
               <a:rPr lang="en-GB" dirty="0"/>
-              <a:t>The ZQSD keys</a:t>
+              <a:t>The </a:t>
+            </a:r>
+            <a:r>
+              <a:rPr lang="en-GB" b="1" dirty="0"/>
+              <a:t>ZQSD</a:t>
+            </a:r>
+            <a:r>
+              <a:rPr lang="en-GB" dirty="0"/>
+              <a:t> keys</a:t>
             </a:r>
           </a:p>
           <a:p>
@@ -5653,7 +5661,15 @@
             </a:pPr>
             <a:r>
               <a:rPr lang="en-GB" dirty="0"/>
-              <a:t>The WASD keys</a:t>
+              <a:t>The </a:t>
+            </a:r>
+            <a:r>
+              <a:rPr lang="en-GB" b="1" dirty="0"/>
+              <a:t>WASD</a:t>
+            </a:r>
+            <a:r>
+              <a:rPr lang="en-GB" dirty="0"/>
+              <a:t> keys</a:t>
             </a:r>
             <a:endParaRPr lang="fr-FR" dirty="0"/>
           </a:p>
@@ -5688,7 +5704,15 @@
             </a:r>
             <a:r>
               <a:rPr lang="fr-FR" dirty="0"/>
-              <a:t> by the use of the SPACE key.</a:t>
+              <a:t> by the use of the </a:t>
+            </a:r>
+            <a:r>
+              <a:rPr lang="fr-FR" b="1" dirty="0"/>
+              <a:t>SPACE</a:t>
+            </a:r>
+            <a:r>
+              <a:rPr lang="fr-FR" dirty="0"/>
+              <a:t> key.</a:t>
             </a:r>
           </a:p>
           <a:p>
@@ -5722,7 +5746,15 @@
             </a:r>
             <a:r>
               <a:rPr lang="fr-FR" dirty="0"/>
-              <a:t> by the use of the R key. This action </a:t>
+              <a:t> by the use of the </a:t>
+            </a:r>
+            <a:r>
+              <a:rPr lang="fr-FR" b="1" dirty="0"/>
+              <a:t>R</a:t>
+            </a:r>
+            <a:r>
+              <a:rPr lang="fr-FR" dirty="0"/>
+              <a:t> key. This action </a:t>
             </a:r>
             <a:r>
               <a:rPr lang="fr-FR" dirty="0" err="1"/>
@@ -5738,19 +5770,7 @@
             </a:r>
             <a:r>
               <a:rPr lang="fr-FR" dirty="0"/>
-              <a:t> </a:t>
-            </a:r>
-            <a:r>
-              <a:rPr lang="fr-FR" dirty="0">
-                <a:highlight>
-                  <a:srgbClr val="FFFF00"/>
-                </a:highlight>
-              </a:rPr>
-              <a:t>xxx</a:t>
-            </a:r>
-            <a:r>
-              <a:rPr lang="fr-FR" dirty="0"/>
-              <a:t> point to the </a:t>
+              <a:t> 150 point to the </a:t>
             </a:r>
             <a:r>
               <a:rPr lang="fr-FR" dirty="0" err="1"/>

</xml_diff>

<commit_message>
edit pptx (another one)
</commit_message>
<xml_diff>
--- a/Deliverables/Lorann - PowerPoint.pptx
+++ b/Deliverables/Lorann - PowerPoint.pptx
@@ -4667,7 +4667,11 @@
               <a:buChar char="•"/>
             </a:pPr>
             <a:r>
-              <a:rPr lang="en-GB" dirty="0"/>
+              <a:rPr lang="en-GB" dirty="0">
+                <a:highlight>
+                  <a:srgbClr val="FFFF00"/>
+                </a:highlight>
+              </a:rPr>
               <a:t>Demo of the game</a:t>
             </a:r>
           </a:p>

</xml_diff>